<commit_message>
updated README, EDA notebook, presentation, added visuals
</commit_message>
<xml_diff>
--- a/presentation/King County Housing.pptx
+++ b/presentation/King County Housing.pptx
@@ -356,7 +356,7 @@
           <a:p>
             <a:fld id="{88C4B6C0-56E6-435D-AC87-0E0D612400AF}" type="datetimeFigureOut">
               <a:rPr lang="en-US" smtClean="0"/>
-              <a:t>4/26/2024</a:t>
+              <a:t>7/9/2024</a:t>
             </a:fld>
             <a:endParaRPr lang="en-US"/>
           </a:p>
@@ -564,7 +564,7 @@
           <a:p>
             <a:fld id="{88C4B6C0-56E6-435D-AC87-0E0D612400AF}" type="datetimeFigureOut">
               <a:rPr lang="en-US" smtClean="0"/>
-              <a:t>4/26/2024</a:t>
+              <a:t>7/9/2024</a:t>
             </a:fld>
             <a:endParaRPr lang="en-US"/>
           </a:p>
@@ -820,7 +820,7 @@
           <a:p>
             <a:fld id="{88C4B6C0-56E6-435D-AC87-0E0D612400AF}" type="datetimeFigureOut">
               <a:rPr lang="en-US" smtClean="0"/>
-              <a:t>4/26/2024</a:t>
+              <a:t>7/9/2024</a:t>
             </a:fld>
             <a:endParaRPr lang="en-US"/>
           </a:p>
@@ -994,7 +994,7 @@
           <a:p>
             <a:fld id="{88C4B6C0-56E6-435D-AC87-0E0D612400AF}" type="datetimeFigureOut">
               <a:rPr lang="en-US" smtClean="0"/>
-              <a:t>4/26/2024</a:t>
+              <a:t>7/9/2024</a:t>
             </a:fld>
             <a:endParaRPr lang="en-US"/>
           </a:p>
@@ -1337,7 +1337,7 @@
           <a:p>
             <a:fld id="{88C4B6C0-56E6-435D-AC87-0E0D612400AF}" type="datetimeFigureOut">
               <a:rPr lang="en-US" smtClean="0"/>
-              <a:t>4/26/2024</a:t>
+              <a:t>7/9/2024</a:t>
             </a:fld>
             <a:endParaRPr lang="en-US"/>
           </a:p>
@@ -1612,7 +1612,7 @@
           <a:p>
             <a:fld id="{88C4B6C0-56E6-435D-AC87-0E0D612400AF}" type="datetimeFigureOut">
               <a:rPr lang="en-US" smtClean="0"/>
-              <a:t>4/26/2024</a:t>
+              <a:t>7/9/2024</a:t>
             </a:fld>
             <a:endParaRPr lang="en-US"/>
           </a:p>
@@ -1991,7 +1991,7 @@
           <a:p>
             <a:fld id="{88C4B6C0-56E6-435D-AC87-0E0D612400AF}" type="datetimeFigureOut">
               <a:rPr lang="en-US" smtClean="0"/>
-              <a:t>4/26/2024</a:t>
+              <a:t>7/9/2024</a:t>
             </a:fld>
             <a:endParaRPr lang="en-US"/>
           </a:p>
@@ -2109,7 +2109,7 @@
           <a:p>
             <a:fld id="{88C4B6C0-56E6-435D-AC87-0E0D612400AF}" type="datetimeFigureOut">
               <a:rPr lang="en-US" smtClean="0"/>
-              <a:t>4/26/2024</a:t>
+              <a:t>7/9/2024</a:t>
             </a:fld>
             <a:endParaRPr lang="en-US"/>
           </a:p>
@@ -2280,7 +2280,7 @@
           <a:p>
             <a:fld id="{88C4B6C0-56E6-435D-AC87-0E0D612400AF}" type="datetimeFigureOut">
               <a:rPr lang="en-US" smtClean="0"/>
-              <a:t>4/26/2024</a:t>
+              <a:t>7/9/2024</a:t>
             </a:fld>
             <a:endParaRPr lang="en-US"/>
           </a:p>
@@ -2634,7 +2634,7 @@
           <a:p>
             <a:fld id="{88C4B6C0-56E6-435D-AC87-0E0D612400AF}" type="datetimeFigureOut">
               <a:rPr lang="en-US" smtClean="0"/>
-              <a:t>4/26/2024</a:t>
+              <a:t>7/9/2024</a:t>
             </a:fld>
             <a:endParaRPr lang="en-US"/>
           </a:p>
@@ -3016,7 +3016,7 @@
           <a:p>
             <a:fld id="{88C4B6C0-56E6-435D-AC87-0E0D612400AF}" type="datetimeFigureOut">
               <a:rPr lang="en-US" smtClean="0"/>
-              <a:t>4/26/2024</a:t>
+              <a:t>7/9/2024</a:t>
             </a:fld>
             <a:endParaRPr lang="en-US"/>
           </a:p>
@@ -3303,7 +3303,7 @@
           <a:p>
             <a:fld id="{88C4B6C0-56E6-435D-AC87-0E0D612400AF}" type="datetimeFigureOut">
               <a:rPr lang="en-US" smtClean="0"/>
-              <a:t>4/26/2024</a:t>
+              <a:t>7/9/2024</a:t>
             </a:fld>
             <a:endParaRPr lang="en-US"/>
           </a:p>
@@ -4445,7 +4445,7 @@
         <p:spPr>
           <a:xfrm>
             <a:off x="7742124" y="3131066"/>
-            <a:ext cx="3712178" cy="2509242"/>
+            <a:ext cx="3712178" cy="1605915"/>
           </a:xfrm>
           <a:prstGeom prst="snip1Rect">
             <a:avLst/>
@@ -4483,19 +4483,17 @@
             </a:r>
             <a:r>
               <a:rPr lang="en-US" dirty="0" smtClean="0"/>
-              <a:t>the outskirts towards the south-western part of Seattle.</a:t>
+              <a:t>the outskirts towards the south-western part of </a:t>
+            </a:r>
+            <a:r>
+              <a:rPr lang="en-US" dirty="0" smtClean="0"/>
+              <a:t>Seattle</a:t>
+            </a:r>
+            <a:r>
+              <a:rPr lang="hr-HR" dirty="0"/>
+              <a:t>.</a:t>
             </a:r>
             <a:endParaRPr lang="hr-HR" dirty="0" smtClean="0"/>
-          </a:p>
-          <a:p>
-            <a:endParaRPr lang="hr-HR" dirty="0"/>
-          </a:p>
-          <a:p>
-            <a:r>
-              <a:rPr lang="hr-HR" dirty="0" smtClean="0"/>
-              <a:t>Still, the client should reconsider life choices.</a:t>
-            </a:r>
-            <a:endParaRPr lang="en-US" dirty="0"/>
           </a:p>
         </p:txBody>
       </p:sp>
@@ -6469,11 +6467,7 @@
                       <a:pPr algn="ctr"/>
                       <a:r>
                         <a:rPr lang="hr-HR" sz="1400" dirty="0" smtClean="0"/>
-                        <a:t>Median </a:t>
-                      </a:r>
-                      <a:r>
-                        <a:rPr lang="hr-HR" sz="1400" dirty="0" smtClean="0"/>
-                        <a:t>neighbour </a:t>
+                        <a:t>Median neighbour </a:t>
                       </a:r>
                     </a:p>
                     <a:p>
@@ -6973,66 +6967,6 @@
             <a:r>
               <a:rPr lang="hr-HR" dirty="0" smtClean="0"/>
               <a:t>...and thank you Bernie! </a:t>
-            </a:r>
-            <a:endParaRPr lang="en-US" dirty="0"/>
-          </a:p>
-        </p:txBody>
-      </p:sp>
-      <p:pic>
-        <p:nvPicPr>
-          <p:cNvPr id="10" name="Picture 9"/>
-          <p:cNvPicPr>
-            <a:picLocks noChangeAspect="1"/>
-          </p:cNvPicPr>
-          <p:nvPr/>
-        </p:nvPicPr>
-        <p:blipFill>
-          <a:blip r:embed="rId4" cstate="print">
-            <a:extLst>
-              <a:ext uri="{28A0092B-C50C-407E-A947-70E740481C1C}">
-                <a14:useLocalDpi xmlns:a14="http://schemas.microsoft.com/office/drawing/2010/main" val="0"/>
-              </a:ext>
-            </a:extLst>
-          </a:blip>
-          <a:stretch>
-            <a:fillRect/>
-          </a:stretch>
-        </p:blipFill>
-        <p:spPr>
-          <a:xfrm>
-            <a:off x="10489739" y="5014499"/>
-            <a:ext cx="1307061" cy="677936"/>
-          </a:xfrm>
-          <a:prstGeom prst="rect">
-            <a:avLst/>
-          </a:prstGeom>
-        </p:spPr>
-      </p:pic>
-      <p:sp>
-        <p:nvSpPr>
-          <p:cNvPr id="11" name="TextBox 10"/>
-          <p:cNvSpPr txBox="1"/>
-          <p:nvPr/>
-        </p:nvSpPr>
-        <p:spPr>
-          <a:xfrm>
-            <a:off x="10489739" y="4459022"/>
-            <a:ext cx="1196411" cy="369332"/>
-          </a:xfrm>
-          <a:prstGeom prst="rect">
-            <a:avLst/>
-          </a:prstGeom>
-          <a:noFill/>
-        </p:spPr>
-        <p:txBody>
-          <a:bodyPr wrap="square" rtlCol="0">
-            <a:spAutoFit/>
-          </a:bodyPr>
-          <a:lstStyle/>
-          <a:p>
-            <a:r>
-              <a:rPr lang="hr-HR" dirty="0" smtClean="0"/>
-              <a:t>God bless</a:t>
             </a:r>
             <a:endParaRPr lang="en-US" dirty="0"/>
           </a:p>
@@ -7138,60 +7072,6 @@
                                   </p:childTnLst>
                                 </p:cTn>
                               </p:par>
-                              <p:par>
-                                <p:cTn id="11" presetID="1" presetClass="entr" presetSubtype="0" fill="hold" nodeType="withEffect">
-                                  <p:stCondLst>
-                                    <p:cond delay="0"/>
-                                  </p:stCondLst>
-                                  <p:childTnLst>
-                                    <p:set>
-                                      <p:cBhvr>
-                                        <p:cTn id="12" dur="1" fill="hold">
-                                          <p:stCondLst>
-                                            <p:cond delay="0"/>
-                                          </p:stCondLst>
-                                        </p:cTn>
-                                        <p:tgtEl>
-                                          <p:spTgt spid="10"/>
-                                        </p:tgtEl>
-                                        <p:attrNameLst>
-                                          <p:attrName>style.visibility</p:attrName>
-                                        </p:attrNameLst>
-                                      </p:cBhvr>
-                                      <p:to>
-                                        <p:strVal val="visible"/>
-                                      </p:to>
-                                    </p:set>
-                                  </p:childTnLst>
-                                </p:cTn>
-                              </p:par>
-                              <p:par>
-                                <p:cTn id="13" presetID="1" presetClass="entr" presetSubtype="0" fill="hold" grpId="0" nodeType="withEffect">
-                                  <p:stCondLst>
-                                    <p:cond delay="0"/>
-                                  </p:stCondLst>
-                                  <p:childTnLst>
-                                    <p:set>
-                                      <p:cBhvr>
-                                        <p:cTn id="14" dur="1" fill="hold">
-                                          <p:stCondLst>
-                                            <p:cond delay="0"/>
-                                          </p:stCondLst>
-                                        </p:cTn>
-                                        <p:tgtEl>
-                                          <p:spTgt spid="11"/>
-                                        </p:tgtEl>
-                                        <p:attrNameLst>
-                                          <p:attrName>style.visibility</p:attrName>
-                                        </p:attrNameLst>
-                                      </p:cBhvr>
-                                      <p:to>
-                                        <p:strVal val="visible"/>
-                                      </p:to>
-                                    </p:set>
-                                  </p:childTnLst>
-                                </p:cTn>
-                              </p:par>
                             </p:childTnLst>
                           </p:cTn>
                         </p:par>
@@ -7221,7 +7101,6 @@
     </p:tnLst>
     <p:bldLst>
       <p:bldP spid="9" grpId="0"/>
-      <p:bldP spid="11" grpId="0"/>
     </p:bldLst>
   </p:timing>
 </p:sld>
@@ -7368,7 +7247,11 @@
             </a:r>
             <a:r>
               <a:rPr lang="hr-HR" dirty="0" smtClean="0"/>
-              <a:t>house with </a:t>
+              <a:t>house </a:t>
+            </a:r>
+            <a:r>
+              <a:rPr lang="hr-HR" dirty="0" smtClean="0"/>
+              <a:t>with a </a:t>
             </a:r>
             <a:r>
               <a:rPr lang="en-US" dirty="0" smtClean="0"/>
@@ -7384,35 +7267,6 @@
           </a:p>
         </p:txBody>
       </p:sp>
-      <p:pic>
-        <p:nvPicPr>
-          <p:cNvPr id="4" name="Picture 3"/>
-          <p:cNvPicPr>
-            <a:picLocks noChangeAspect="1"/>
-          </p:cNvPicPr>
-          <p:nvPr/>
-        </p:nvPicPr>
-        <p:blipFill rotWithShape="1">
-          <a:blip r:embed="rId2" cstate="print">
-            <a:extLst>
-              <a:ext uri="{28A0092B-C50C-407E-A947-70E740481C1C}">
-                <a14:useLocalDpi xmlns:a14="http://schemas.microsoft.com/office/drawing/2010/main" val="0"/>
-              </a:ext>
-            </a:extLst>
-          </a:blip>
-          <a:srcRect l="33650" t="33664" r="33899" b="33888"/>
-          <a:stretch/>
-        </p:blipFill>
-        <p:spPr>
-          <a:xfrm>
-            <a:off x="3959173" y="4357762"/>
-            <a:ext cx="337641" cy="337641"/>
-          </a:xfrm>
-          <a:prstGeom prst="rect">
-            <a:avLst/>
-          </a:prstGeom>
-        </p:spPr>
-      </p:pic>
       <p:pic>
         <p:nvPicPr>
           <p:cNvPr id="5" name="Picture 4"/>
@@ -7422,7 +7276,7 @@
           <p:nvPr/>
         </p:nvPicPr>
         <p:blipFill>
-          <a:blip r:embed="rId3">
+          <a:blip r:embed="rId2">
             <a:extLst>
               <a:ext uri="{28A0092B-C50C-407E-A947-70E740481C1C}">
                 <a14:useLocalDpi xmlns:a14="http://schemas.microsoft.com/office/drawing/2010/main" val="0"/>
@@ -7452,7 +7306,7 @@
           <p:nvPr/>
         </p:nvPicPr>
         <p:blipFill>
-          <a:blip r:embed="rId4"/>
+          <a:blip r:embed="rId3"/>
           <a:stretch>
             <a:fillRect/>
           </a:stretch>
@@ -7883,7 +7737,15 @@
             </a:pPr>
             <a:r>
               <a:rPr lang="hr-HR" dirty="0" smtClean="0"/>
-              <a:t>Conduct anaylsis on variables of interest, test hypotheses</a:t>
+              <a:t>Conduct </a:t>
+            </a:r>
+            <a:r>
+              <a:rPr lang="hr-HR" dirty="0" smtClean="0"/>
+              <a:t>analysis </a:t>
+            </a:r>
+            <a:r>
+              <a:rPr lang="hr-HR" dirty="0" smtClean="0"/>
+              <a:t>on variables of interest, test hypotheses</a:t>
             </a:r>
           </a:p>
           <a:p>
@@ -7958,7 +7820,7 @@
           <p:nvPr>
             <p:extLst>
               <p:ext uri="{D42A27DB-BD31-4B8C-83A1-F6EECF244321}">
-                <p14:modId xmlns:p14="http://schemas.microsoft.com/office/powerpoint/2010/main" val="3908693141"/>
+                <p14:modId xmlns:p14="http://schemas.microsoft.com/office/powerpoint/2010/main" val="2928635253"/>
               </p:ext>
             </p:extLst>
           </p:nvPr>
@@ -8071,7 +7933,11 @@
                       </a:br>
                       <a:r>
                         <a:rPr lang="hr-HR" baseline="0" dirty="0" smtClean="0"/>
-                        <a:t>but ain’t got the cash</a:t>
+                        <a:t>but </a:t>
+                      </a:r>
+                      <a:r>
+                        <a:rPr lang="hr-HR" baseline="0" dirty="0" smtClean="0"/>
+                        <a:t>doesn’t have the money</a:t>
                       </a:r>
                       <a:endParaRPr lang="en-US" dirty="0"/>
                     </a:p>
@@ -8232,11 +8098,11 @@
           <a:p>
             <a:r>
               <a:rPr lang="en-US" dirty="0" smtClean="0"/>
-              <a:t>The client might able to afford some of the more spacious </a:t>
+              <a:t>The client </a:t>
             </a:r>
             <a:r>
               <a:rPr lang="en-US" dirty="0" smtClean="0"/>
-              <a:t>houses</a:t>
+              <a:t>might</a:t>
             </a:r>
             <a:r>
               <a:rPr lang="hr-HR" dirty="0"/>
@@ -8244,9 +8110,24 @@
             </a:r>
             <a:r>
               <a:rPr lang="hr-HR" dirty="0" smtClean="0"/>
+              <a:t>potentially be</a:t>
+            </a:r>
+            <a:r>
+              <a:rPr lang="en-US" dirty="0" smtClean="0"/>
+              <a:t> </a:t>
+            </a:r>
+            <a:r>
+              <a:rPr lang="en-US" dirty="0" smtClean="0"/>
+              <a:t>able to afford some of the more spacious houses</a:t>
+            </a:r>
+            <a:r>
+              <a:rPr lang="hr-HR" dirty="0"/>
+              <a:t> </a:t>
+            </a:r>
+            <a:r>
+              <a:rPr lang="hr-HR" dirty="0" smtClean="0"/>
               <a:t>due to higher price ranges.</a:t>
             </a:r>
-            <a:endParaRPr lang="hr-HR" dirty="0" smtClean="0"/>
           </a:p>
         </p:txBody>
       </p:sp>

</xml_diff>